<commit_message>
addressing feedback comments from daniel mccoy
</commit_message>
<xml_diff>
--- a/docs/deployment_guide/images/quickstart-cisco-ise-on-aws-architecture-diagram.pptx
+++ b/docs/deployment_guide/images/quickstart-cisco-ise-on-aws-architecture-diagram.pptx
@@ -226,7 +226,7 @@
           <a:p>
             <a:fld id="{49A7721D-1176-A640-AC48-B82F78C92D56}" type="datetimeFigureOut">
               <a:rPr lang="en-US" smtClean="0"/>
-              <a:t>10/8/22</a:t>
+              <a:t>10/13/22</a:t>
             </a:fld>
             <a:endParaRPr lang="en-US" dirty="0"/>
           </a:p>
@@ -403,7 +403,7 @@
           <a:p>
             <a:fld id="{C884A089-FB25-6D46-9D21-F0F04A18BCA8}" type="datetimeFigureOut">
               <a:rPr lang="en-US" smtClean="0"/>
-              <a:t>10/8/22</a:t>
+              <a:t>10/13/22</a:t>
             </a:fld>
             <a:endParaRPr lang="en-US" dirty="0"/>
           </a:p>
@@ -1213,7 +1213,7 @@
           <a:p>
             <a:fld id="{C764DE79-268F-4C1A-8933-263129D2AF90}" type="datetimeFigureOut">
               <a:rPr lang="en-US" dirty="0"/>
-              <a:t>10/8/22</a:t>
+              <a:t>10/13/22</a:t>
             </a:fld>
             <a:endParaRPr lang="en-US" dirty="0"/>
           </a:p>
@@ -1384,7 +1384,7 @@
           <a:p>
             <a:fld id="{C764DE79-268F-4C1A-8933-263129D2AF90}" type="datetimeFigureOut">
               <a:rPr lang="en-US" dirty="0"/>
-              <a:t>10/8/22</a:t>
+              <a:t>10/13/22</a:t>
             </a:fld>
             <a:endParaRPr lang="en-US" dirty="0"/>
           </a:p>
@@ -1565,7 +1565,7 @@
           <a:p>
             <a:fld id="{C764DE79-268F-4C1A-8933-263129D2AF90}" type="datetimeFigureOut">
               <a:rPr lang="en-US" dirty="0"/>
-              <a:t>10/8/22</a:t>
+              <a:t>10/13/22</a:t>
             </a:fld>
             <a:endParaRPr lang="en-US" dirty="0"/>
           </a:p>
@@ -1758,7 +1758,7 @@
           <a:p>
             <a:fld id="{C764DE79-268F-4C1A-8933-263129D2AF90}" type="datetimeFigureOut">
               <a:rPr lang="en-US" dirty="0"/>
-              <a:t>10/8/22</a:t>
+              <a:t>10/13/22</a:t>
             </a:fld>
             <a:endParaRPr lang="en-US" dirty="0"/>
           </a:p>
@@ -1929,7 +1929,7 @@
           <a:p>
             <a:fld id="{C764DE79-268F-4C1A-8933-263129D2AF90}" type="datetimeFigureOut">
               <a:rPr lang="en-US" dirty="0"/>
-              <a:t>10/8/22</a:t>
+              <a:t>10/13/22</a:t>
             </a:fld>
             <a:endParaRPr lang="en-US" dirty="0"/>
           </a:p>
@@ -2174,7 +2174,7 @@
           <a:p>
             <a:fld id="{C764DE79-268F-4C1A-8933-263129D2AF90}" type="datetimeFigureOut">
               <a:rPr lang="en-US" dirty="0"/>
-              <a:t>10/8/22</a:t>
+              <a:t>10/13/22</a:t>
             </a:fld>
             <a:endParaRPr lang="en-US" dirty="0"/>
           </a:p>
@@ -2407,7 +2407,7 @@
           <a:p>
             <a:fld id="{C764DE79-268F-4C1A-8933-263129D2AF90}" type="datetimeFigureOut">
               <a:rPr lang="en-US" dirty="0"/>
-              <a:t>10/8/22</a:t>
+              <a:t>10/13/22</a:t>
             </a:fld>
             <a:endParaRPr lang="en-US" dirty="0"/>
           </a:p>
@@ -2775,7 +2775,7 @@
           <a:p>
             <a:fld id="{C764DE79-268F-4C1A-8933-263129D2AF90}" type="datetimeFigureOut">
               <a:rPr lang="en-US" dirty="0"/>
-              <a:t>10/8/22</a:t>
+              <a:t>10/13/22</a:t>
             </a:fld>
             <a:endParaRPr lang="en-US" dirty="0"/>
           </a:p>
@@ -2894,7 +2894,7 @@
           <a:p>
             <a:fld id="{C764DE79-268F-4C1A-8933-263129D2AF90}" type="datetimeFigureOut">
               <a:rPr lang="en-US" dirty="0"/>
-              <a:t>10/8/22</a:t>
+              <a:t>10/13/22</a:t>
             </a:fld>
             <a:endParaRPr lang="en-US" dirty="0"/>
           </a:p>
@@ -3263,7 +3263,7 @@
           <a:p>
             <a:fld id="{C764DE79-268F-4C1A-8933-263129D2AF90}" type="datetimeFigureOut">
               <a:rPr lang="en-US" dirty="0"/>
-              <a:t>10/8/22</a:t>
+              <a:t>10/13/22</a:t>
             </a:fld>
             <a:endParaRPr lang="en-US" dirty="0"/>
           </a:p>
@@ -3797,7 +3797,7 @@
           <a:p>
             <a:fld id="{C764DE79-268F-4C1A-8933-263129D2AF90}" type="datetimeFigureOut">
               <a:rPr lang="en-US" dirty="0"/>
-              <a:t>10/8/22</a:t>
+              <a:t>10/13/22</a:t>
             </a:fld>
             <a:endParaRPr lang="en-US" dirty="0"/>
           </a:p>
@@ -8079,7 +8079,7 @@
         </p:blipFill>
         <p:spPr bwMode="auto">
           <a:xfrm>
-            <a:off x="6290387" y="5766400"/>
+            <a:off x="6290387" y="5754825"/>
             <a:ext cx="457200" cy="457200"/>
           </a:xfrm>
           <a:prstGeom prst="rect">
@@ -8110,100 +8110,6 @@
           </a:extLst>
         </p:spPr>
       </p:pic>
-      <p:cxnSp>
-        <p:nvCxnSpPr>
-          <p:cNvPr id="58" name="Straight Connector 57">
-            <a:extLst>
-              <a:ext uri="{FF2B5EF4-FFF2-40B4-BE49-F238E27FC236}">
-                <a16:creationId xmlns:a16="http://schemas.microsoft.com/office/drawing/2014/main" id="{CB17ACE4-DC72-CB4E-7901-6DFC0DA9E765}"/>
-              </a:ext>
-            </a:extLst>
-          </p:cNvPr>
-          <p:cNvCxnSpPr>
-            <a:cxnSpLocks/>
-          </p:cNvCxnSpPr>
-          <p:nvPr/>
-        </p:nvCxnSpPr>
-        <p:spPr>
-          <a:xfrm flipV="1">
-            <a:off x="3917960" y="5218852"/>
-            <a:ext cx="739559" cy="509483"/>
-          </a:xfrm>
-          <a:prstGeom prst="line">
-            <a:avLst/>
-          </a:prstGeom>
-          <a:ln w="9525" cap="flat" cmpd="sng" algn="ctr">
-            <a:solidFill>
-              <a:schemeClr val="accent4"/>
-            </a:solidFill>
-            <a:prstDash val="dash"/>
-            <a:round/>
-            <a:headEnd type="none" w="med" len="med"/>
-            <a:tailEnd type="none" w="med" len="med"/>
-          </a:ln>
-        </p:spPr>
-        <p:style>
-          <a:lnRef idx="0">
-            <a:scrgbClr r="0" g="0" b="0"/>
-          </a:lnRef>
-          <a:fillRef idx="0">
-            <a:scrgbClr r="0" g="0" b="0"/>
-          </a:fillRef>
-          <a:effectRef idx="0">
-            <a:scrgbClr r="0" g="0" b="0"/>
-          </a:effectRef>
-          <a:fontRef idx="minor">
-            <a:schemeClr val="tx1"/>
-          </a:fontRef>
-        </p:style>
-      </p:cxnSp>
-      <p:cxnSp>
-        <p:nvCxnSpPr>
-          <p:cNvPr id="60" name="Straight Connector 59">
-            <a:extLst>
-              <a:ext uri="{FF2B5EF4-FFF2-40B4-BE49-F238E27FC236}">
-                <a16:creationId xmlns:a16="http://schemas.microsoft.com/office/drawing/2014/main" id="{4CB714C8-0937-395E-8ED3-7003186ED865}"/>
-              </a:ext>
-            </a:extLst>
-          </p:cNvPr>
-          <p:cNvCxnSpPr>
-            <a:cxnSpLocks/>
-          </p:cNvCxnSpPr>
-          <p:nvPr/>
-        </p:nvCxnSpPr>
-        <p:spPr>
-          <a:xfrm flipH="1" flipV="1">
-            <a:off x="5472971" y="5249516"/>
-            <a:ext cx="746973" cy="488853"/>
-          </a:xfrm>
-          <a:prstGeom prst="line">
-            <a:avLst/>
-          </a:prstGeom>
-          <a:ln w="9525" cap="flat" cmpd="sng" algn="ctr">
-            <a:solidFill>
-              <a:schemeClr val="accent4"/>
-            </a:solidFill>
-            <a:prstDash val="dash"/>
-            <a:round/>
-            <a:headEnd type="none" w="med" len="med"/>
-            <a:tailEnd type="none" w="med" len="med"/>
-          </a:ln>
-        </p:spPr>
-        <p:style>
-          <a:lnRef idx="0">
-            <a:scrgbClr r="0" g="0" b="0"/>
-          </a:lnRef>
-          <a:fillRef idx="0">
-            <a:scrgbClr r="0" g="0" b="0"/>
-          </a:fillRef>
-          <a:effectRef idx="0">
-            <a:scrgbClr r="0" g="0" b="0"/>
-          </a:effectRef>
-          <a:fontRef idx="minor">
-            <a:schemeClr val="tx1"/>
-          </a:fontRef>
-        </p:style>
-      </p:cxnSp>
       <p:sp>
         <p:nvSpPr>
           <p:cNvPr id="56" name="TextBox 11">
@@ -8365,6 +8271,96 @@
           </a:p>
         </p:txBody>
       </p:sp>
+      <p:cxnSp>
+        <p:nvCxnSpPr>
+          <p:cNvPr id="59" name="Straight Arrow Connector 58">
+            <a:extLst>
+              <a:ext uri="{FF2B5EF4-FFF2-40B4-BE49-F238E27FC236}">
+                <a16:creationId xmlns:a16="http://schemas.microsoft.com/office/drawing/2014/main" id="{DAEF1FC5-85A6-EAC7-5158-9B0B6EA698D8}"/>
+              </a:ext>
+            </a:extLst>
+          </p:cNvPr>
+          <p:cNvCxnSpPr>
+            <a:cxnSpLocks/>
+          </p:cNvCxnSpPr>
+          <p:nvPr/>
+        </p:nvCxnSpPr>
+        <p:spPr>
+          <a:xfrm flipV="1">
+            <a:off x="3888740" y="5244465"/>
+            <a:ext cx="822156" cy="483870"/>
+          </a:xfrm>
+          <a:prstGeom prst="straightConnector1">
+            <a:avLst/>
+          </a:prstGeom>
+          <a:ln w="12700">
+            <a:solidFill>
+              <a:srgbClr val="545B64"/>
+            </a:solidFill>
+            <a:headEnd type="arrow" w="med" len="sm"/>
+            <a:tailEnd type="none" w="med" len="sm"/>
+          </a:ln>
+        </p:spPr>
+        <p:style>
+          <a:lnRef idx="1">
+            <a:schemeClr val="accent1"/>
+          </a:lnRef>
+          <a:fillRef idx="0">
+            <a:schemeClr val="accent1"/>
+          </a:fillRef>
+          <a:effectRef idx="0">
+            <a:schemeClr val="accent1"/>
+          </a:effectRef>
+          <a:fontRef idx="minor">
+            <a:schemeClr val="tx1"/>
+          </a:fontRef>
+        </p:style>
+      </p:cxnSp>
+      <p:cxnSp>
+        <p:nvCxnSpPr>
+          <p:cNvPr id="61" name="Straight Arrow Connector 60">
+            <a:extLst>
+              <a:ext uri="{FF2B5EF4-FFF2-40B4-BE49-F238E27FC236}">
+                <a16:creationId xmlns:a16="http://schemas.microsoft.com/office/drawing/2014/main" id="{497DDF8B-BE4A-E495-E843-F8DBC2C3E82B}"/>
+              </a:ext>
+            </a:extLst>
+          </p:cNvPr>
+          <p:cNvCxnSpPr>
+            <a:cxnSpLocks/>
+          </p:cNvCxnSpPr>
+          <p:nvPr/>
+        </p:nvCxnSpPr>
+        <p:spPr>
+          <a:xfrm flipH="1" flipV="1">
+            <a:off x="5346337" y="5244465"/>
+            <a:ext cx="944050" cy="568715"/>
+          </a:xfrm>
+          <a:prstGeom prst="straightConnector1">
+            <a:avLst/>
+          </a:prstGeom>
+          <a:ln w="12700">
+            <a:solidFill>
+              <a:srgbClr val="545B64"/>
+            </a:solidFill>
+            <a:headEnd type="arrow" w="med" len="sm"/>
+            <a:tailEnd type="none" w="med" len="sm"/>
+          </a:ln>
+        </p:spPr>
+        <p:style>
+          <a:lnRef idx="1">
+            <a:schemeClr val="accent1"/>
+          </a:lnRef>
+          <a:fillRef idx="0">
+            <a:schemeClr val="accent1"/>
+          </a:fillRef>
+          <a:effectRef idx="0">
+            <a:schemeClr val="accent1"/>
+          </a:effectRef>
+          <a:fontRef idx="minor">
+            <a:schemeClr val="tx1"/>
+          </a:fontRef>
+        </p:style>
+      </p:cxnSp>
     </p:spTree>
     <p:extLst>
       <p:ext uri="{BB962C8B-B14F-4D97-AF65-F5344CB8AC3E}">
@@ -11590,100 +11586,6 @@
           </a:extLst>
         </p:spPr>
       </p:pic>
-      <p:cxnSp>
-        <p:nvCxnSpPr>
-          <p:cNvPr id="58" name="Straight Connector 57">
-            <a:extLst>
-              <a:ext uri="{FF2B5EF4-FFF2-40B4-BE49-F238E27FC236}">
-                <a16:creationId xmlns:a16="http://schemas.microsoft.com/office/drawing/2014/main" id="{CB17ACE4-DC72-CB4E-7901-6DFC0DA9E765}"/>
-              </a:ext>
-            </a:extLst>
-          </p:cNvPr>
-          <p:cNvCxnSpPr>
-            <a:cxnSpLocks/>
-          </p:cNvCxnSpPr>
-          <p:nvPr/>
-        </p:nvCxnSpPr>
-        <p:spPr>
-          <a:xfrm flipV="1">
-            <a:off x="3062243" y="5211416"/>
-            <a:ext cx="801826" cy="502468"/>
-          </a:xfrm>
-          <a:prstGeom prst="line">
-            <a:avLst/>
-          </a:prstGeom>
-          <a:ln w="9525" cap="flat" cmpd="sng" algn="ctr">
-            <a:solidFill>
-              <a:schemeClr val="accent4"/>
-            </a:solidFill>
-            <a:prstDash val="dash"/>
-            <a:round/>
-            <a:headEnd type="none" w="med" len="med"/>
-            <a:tailEnd type="none" w="med" len="med"/>
-          </a:ln>
-        </p:spPr>
-        <p:style>
-          <a:lnRef idx="0">
-            <a:scrgbClr r="0" g="0" b="0"/>
-          </a:lnRef>
-          <a:fillRef idx="0">
-            <a:scrgbClr r="0" g="0" b="0"/>
-          </a:fillRef>
-          <a:effectRef idx="0">
-            <a:scrgbClr r="0" g="0" b="0"/>
-          </a:effectRef>
-          <a:fontRef idx="minor">
-            <a:schemeClr val="tx1"/>
-          </a:fontRef>
-        </p:style>
-      </p:cxnSp>
-      <p:cxnSp>
-        <p:nvCxnSpPr>
-          <p:cNvPr id="60" name="Straight Connector 59">
-            <a:extLst>
-              <a:ext uri="{FF2B5EF4-FFF2-40B4-BE49-F238E27FC236}">
-                <a16:creationId xmlns:a16="http://schemas.microsoft.com/office/drawing/2014/main" id="{4CB714C8-0937-395E-8ED3-7003186ED865}"/>
-              </a:ext>
-            </a:extLst>
-          </p:cNvPr>
-          <p:cNvCxnSpPr>
-            <a:cxnSpLocks/>
-          </p:cNvCxnSpPr>
-          <p:nvPr/>
-        </p:nvCxnSpPr>
-        <p:spPr>
-          <a:xfrm flipH="1" flipV="1">
-            <a:off x="4609371" y="5211416"/>
-            <a:ext cx="767714" cy="531346"/>
-          </a:xfrm>
-          <a:prstGeom prst="line">
-            <a:avLst/>
-          </a:prstGeom>
-          <a:ln w="9525" cap="flat" cmpd="sng" algn="ctr">
-            <a:solidFill>
-              <a:schemeClr val="accent4"/>
-            </a:solidFill>
-            <a:prstDash val="dash"/>
-            <a:round/>
-            <a:headEnd type="none" w="med" len="med"/>
-            <a:tailEnd type="none" w="med" len="med"/>
-          </a:ln>
-        </p:spPr>
-        <p:style>
-          <a:lnRef idx="0">
-            <a:scrgbClr r="0" g="0" b="0"/>
-          </a:lnRef>
-          <a:fillRef idx="0">
-            <a:scrgbClr r="0" g="0" b="0"/>
-          </a:fillRef>
-          <a:effectRef idx="0">
-            <a:scrgbClr r="0" g="0" b="0"/>
-          </a:effectRef>
-          <a:fontRef idx="minor">
-            <a:schemeClr val="tx1"/>
-          </a:fontRef>
-        </p:style>
-      </p:cxnSp>
       <p:pic>
         <p:nvPicPr>
           <p:cNvPr id="65" name="Graphic 13">
@@ -12639,39 +12541,32 @@
       </p:sp>
       <p:cxnSp>
         <p:nvCxnSpPr>
-          <p:cNvPr id="79" name="Elbow Connector 78">
+          <p:cNvPr id="59" name="Straight Arrow Connector 58">
             <a:extLst>
               <a:ext uri="{FF2B5EF4-FFF2-40B4-BE49-F238E27FC236}">
-                <a16:creationId xmlns:a16="http://schemas.microsoft.com/office/drawing/2014/main" id="{F1CC4093-CEDB-5FDD-406F-4769FB10ADA4}"/>
+                <a16:creationId xmlns:a16="http://schemas.microsoft.com/office/drawing/2014/main" id="{6664C3AE-1C6F-E17B-AD13-E2FBDA594E1E}"/>
               </a:ext>
             </a:extLst>
           </p:cNvPr>
           <p:cNvCxnSpPr>
             <a:cxnSpLocks/>
-            <a:stCxn id="65" idx="1"/>
-            <a:endCxn id="46" idx="2"/>
           </p:cNvCxnSpPr>
           <p:nvPr/>
         </p:nvCxnSpPr>
         <p:spPr>
-          <a:xfrm rot="10800000" flipV="1">
-            <a:off x="5651787" y="4354017"/>
-            <a:ext cx="3332823" cy="2226685"/>
+          <a:xfrm flipV="1">
+            <a:off x="2948940" y="5157850"/>
+            <a:ext cx="940288" cy="595885"/>
           </a:xfrm>
-          <a:prstGeom prst="bentConnector4">
-            <a:avLst>
-              <a:gd name="adj1" fmla="val 59448"/>
-              <a:gd name="adj2" fmla="val 110266"/>
-            </a:avLst>
+          <a:prstGeom prst="straightConnector1">
+            <a:avLst/>
           </a:prstGeom>
-          <a:ln>
+          <a:ln w="12700">
             <a:solidFill>
-              <a:schemeClr val="tx1">
-                <a:lumMod val="50000"/>
-                <a:lumOff val="50000"/>
-              </a:schemeClr>
+              <a:srgbClr val="545B64"/>
             </a:solidFill>
-            <a:tailEnd type="triangle"/>
+            <a:headEnd type="arrow" w="med" len="sm"/>
+            <a:tailEnd type="none" w="med" len="sm"/>
           </a:ln>
         </p:spPr>
         <p:style>
@@ -12691,39 +12586,32 @@
       </p:cxnSp>
       <p:cxnSp>
         <p:nvCxnSpPr>
-          <p:cNvPr id="88" name="Elbow Connector 87">
+          <p:cNvPr id="61" name="Straight Arrow Connector 60">
             <a:extLst>
               <a:ext uri="{FF2B5EF4-FFF2-40B4-BE49-F238E27FC236}">
-                <a16:creationId xmlns:a16="http://schemas.microsoft.com/office/drawing/2014/main" id="{0167282E-1964-5EEE-E9F8-DE9E8610B5A9}"/>
+                <a16:creationId xmlns:a16="http://schemas.microsoft.com/office/drawing/2014/main" id="{06C9DCD1-E613-B24E-1118-C81B75FDCAAE}"/>
               </a:ext>
             </a:extLst>
           </p:cNvPr>
           <p:cNvCxnSpPr>
             <a:cxnSpLocks/>
-            <a:stCxn id="65" idx="1"/>
-            <a:endCxn id="43" idx="2"/>
           </p:cNvCxnSpPr>
           <p:nvPr/>
         </p:nvCxnSpPr>
         <p:spPr>
-          <a:xfrm rot="10800000" flipV="1">
-            <a:off x="2797667" y="4354018"/>
-            <a:ext cx="6186942" cy="2224304"/>
+          <a:xfrm flipH="1" flipV="1">
+            <a:off x="4584039" y="5174375"/>
+            <a:ext cx="836515" cy="579360"/>
           </a:xfrm>
-          <a:prstGeom prst="bentConnector4">
-            <a:avLst>
-              <a:gd name="adj1" fmla="val 32248"/>
-              <a:gd name="adj2" fmla="val 110277"/>
-            </a:avLst>
+          <a:prstGeom prst="straightConnector1">
+            <a:avLst/>
           </a:prstGeom>
-          <a:ln>
+          <a:ln w="12700">
             <a:solidFill>
-              <a:schemeClr val="tx1">
-                <a:lumMod val="50000"/>
-                <a:lumOff val="50000"/>
-              </a:schemeClr>
+              <a:srgbClr val="545B64"/>
             </a:solidFill>
-            <a:tailEnd type="triangle"/>
+            <a:headEnd type="arrow" w="med" len="sm"/>
+            <a:tailEnd type="none" w="med" len="sm"/>
           </a:ln>
         </p:spPr>
         <p:style>
@@ -12743,36 +12631,33 @@
       </p:cxnSp>
       <p:cxnSp>
         <p:nvCxnSpPr>
-          <p:cNvPr id="95" name="Elbow Connector 94">
+          <p:cNvPr id="74" name="Straight Arrow Connector 73">
             <a:extLst>
               <a:ext uri="{FF2B5EF4-FFF2-40B4-BE49-F238E27FC236}">
-                <a16:creationId xmlns:a16="http://schemas.microsoft.com/office/drawing/2014/main" id="{C3DCB4D7-E257-59BF-14D0-71543885C726}"/>
+                <a16:creationId xmlns:a16="http://schemas.microsoft.com/office/drawing/2014/main" id="{E0234B2F-384A-2C08-AECC-C90BED034A6D}"/>
               </a:ext>
             </a:extLst>
           </p:cNvPr>
           <p:cNvCxnSpPr>
             <a:cxnSpLocks/>
+            <a:endCxn id="68" idx="1"/>
           </p:cNvCxnSpPr>
           <p:nvPr/>
         </p:nvCxnSpPr>
         <p:spPr>
-          <a:xfrm rot="10800000" flipV="1">
-            <a:off x="7011747" y="5051167"/>
-            <a:ext cx="1972866" cy="1"/>
+          <a:xfrm>
+            <a:off x="6996546" y="5038470"/>
+            <a:ext cx="1988063" cy="0"/>
           </a:xfrm>
-          <a:prstGeom prst="bentConnector3">
-            <a:avLst>
-              <a:gd name="adj1" fmla="val 50000"/>
-            </a:avLst>
+          <a:prstGeom prst="straightConnector1">
+            <a:avLst/>
           </a:prstGeom>
-          <a:ln>
+          <a:ln w="12700">
             <a:solidFill>
-              <a:schemeClr val="tx1">
-                <a:lumMod val="50000"/>
-                <a:lumOff val="50000"/>
-              </a:schemeClr>
+              <a:srgbClr val="545B64"/>
             </a:solidFill>
-            <a:tailEnd type="triangle"/>
+            <a:headEnd type="arrow" w="med" len="sm"/>
+            <a:tailEnd type="none" w="med" len="sm"/>
           </a:ln>
         </p:spPr>
         <p:style>
@@ -12792,37 +12677,33 @@
       </p:cxnSp>
       <p:cxnSp>
         <p:nvCxnSpPr>
-          <p:cNvPr id="98" name="Elbow Connector 97">
+          <p:cNvPr id="75" name="Straight Arrow Connector 74">
             <a:extLst>
               <a:ext uri="{FF2B5EF4-FFF2-40B4-BE49-F238E27FC236}">
-                <a16:creationId xmlns:a16="http://schemas.microsoft.com/office/drawing/2014/main" id="{814B73B2-FB64-F1B0-8BF5-A4B95D86FAF6}"/>
+                <a16:creationId xmlns:a16="http://schemas.microsoft.com/office/drawing/2014/main" id="{E7833B82-A6A3-E3ED-C1E9-1FB97F9CCE9F}"/>
               </a:ext>
             </a:extLst>
           </p:cNvPr>
           <p:cNvCxnSpPr>
             <a:cxnSpLocks/>
-            <a:stCxn id="70" idx="1"/>
+            <a:endCxn id="70" idx="1"/>
           </p:cNvCxnSpPr>
           <p:nvPr/>
         </p:nvCxnSpPr>
         <p:spPr>
-          <a:xfrm rot="10800000">
-            <a:off x="7002779" y="5660770"/>
-            <a:ext cx="1994530" cy="1"/>
+          <a:xfrm>
+            <a:off x="6991037" y="5660770"/>
+            <a:ext cx="2006272" cy="0"/>
           </a:xfrm>
-          <a:prstGeom prst="bentConnector3">
-            <a:avLst>
-              <a:gd name="adj1" fmla="val 50000"/>
-            </a:avLst>
+          <a:prstGeom prst="straightConnector1">
+            <a:avLst/>
           </a:prstGeom>
-          <a:ln>
+          <a:ln w="12700">
             <a:solidFill>
-              <a:schemeClr val="tx1">
-                <a:lumMod val="50000"/>
-                <a:lumOff val="50000"/>
-              </a:schemeClr>
+              <a:srgbClr val="545B64"/>
             </a:solidFill>
-            <a:tailEnd type="triangle"/>
+            <a:headEnd type="arrow" w="med" len="sm"/>
+            <a:tailEnd type="none" w="med" len="sm"/>
           </a:ln>
         </p:spPr>
         <p:style>
@@ -12842,37 +12723,37 @@
       </p:cxnSp>
       <p:cxnSp>
         <p:nvCxnSpPr>
-          <p:cNvPr id="110" name="Elbow Connector 109">
+          <p:cNvPr id="76" name="Elbow Connector 75">
             <a:extLst>
               <a:ext uri="{FF2B5EF4-FFF2-40B4-BE49-F238E27FC236}">
-                <a16:creationId xmlns:a16="http://schemas.microsoft.com/office/drawing/2014/main" id="{0638C9D3-934C-E2A5-65FD-6AA1D1278340}"/>
+                <a16:creationId xmlns:a16="http://schemas.microsoft.com/office/drawing/2014/main" id="{0185F922-1858-76AE-7BD0-3D20CABEF32E}"/>
               </a:ext>
             </a:extLst>
           </p:cNvPr>
           <p:cNvCxnSpPr>
             <a:cxnSpLocks/>
-            <a:endCxn id="16" idx="1"/>
+            <a:stCxn id="43" idx="2"/>
+            <a:endCxn id="65" idx="1"/>
           </p:cNvCxnSpPr>
           <p:nvPr/>
         </p:nvCxnSpPr>
         <p:spPr>
-          <a:xfrm flipV="1">
-            <a:off x="10816561" y="5224248"/>
-            <a:ext cx="1295759" cy="1098270"/>
+          <a:xfrm rot="5400000" flipH="1" flipV="1">
+            <a:off x="4778986" y="2372699"/>
+            <a:ext cx="2224304" cy="6186942"/>
           </a:xfrm>
-          <a:prstGeom prst="bentConnector3">
+          <a:prstGeom prst="bentConnector4">
             <a:avLst>
-              <a:gd name="adj1" fmla="val 46334"/>
+              <a:gd name="adj1" fmla="val -10277"/>
+              <a:gd name="adj2" fmla="val 67851"/>
             </a:avLst>
           </a:prstGeom>
-          <a:ln>
+          <a:ln w="12700">
             <a:solidFill>
-              <a:schemeClr val="tx1">
-                <a:lumMod val="50000"/>
-                <a:lumOff val="50000"/>
-              </a:schemeClr>
+              <a:srgbClr val="545B64"/>
             </a:solidFill>
-            <a:tailEnd type="triangle"/>
+            <a:headEnd type="arrow" w="med" len="sm"/>
+            <a:tailEnd type="none" w="med" len="sm"/>
           </a:ln>
         </p:spPr>
         <p:style>
@@ -12892,10 +12773,106 @@
       </p:cxnSp>
       <p:cxnSp>
         <p:nvCxnSpPr>
-          <p:cNvPr id="193" name="Elbow Connector 192">
+          <p:cNvPr id="77" name="Elbow Connector 76">
             <a:extLst>
               <a:ext uri="{FF2B5EF4-FFF2-40B4-BE49-F238E27FC236}">
-                <a16:creationId xmlns:a16="http://schemas.microsoft.com/office/drawing/2014/main" id="{32EDE456-1482-1D19-475C-3686DCABEF65}"/>
+                <a16:creationId xmlns:a16="http://schemas.microsoft.com/office/drawing/2014/main" id="{56E2E5CF-E360-C4E0-1C91-211AA3D46F6A}"/>
+              </a:ext>
+            </a:extLst>
+          </p:cNvPr>
+          <p:cNvCxnSpPr>
+            <a:cxnSpLocks/>
+            <a:stCxn id="46" idx="2"/>
+            <a:endCxn id="65" idx="1"/>
+          </p:cNvCxnSpPr>
+          <p:nvPr/>
+        </p:nvCxnSpPr>
+        <p:spPr>
+          <a:xfrm rot="5400000" flipH="1" flipV="1">
+            <a:off x="6204854" y="3800949"/>
+            <a:ext cx="2226685" cy="3332823"/>
+          </a:xfrm>
+          <a:prstGeom prst="bentConnector4">
+            <a:avLst>
+              <a:gd name="adj1" fmla="val -10266"/>
+              <a:gd name="adj2" fmla="val 40077"/>
+            </a:avLst>
+          </a:prstGeom>
+          <a:ln w="12700">
+            <a:solidFill>
+              <a:srgbClr val="545B64"/>
+            </a:solidFill>
+            <a:headEnd type="arrow" w="med" len="sm"/>
+            <a:tailEnd type="none" w="med" len="sm"/>
+          </a:ln>
+        </p:spPr>
+        <p:style>
+          <a:lnRef idx="1">
+            <a:schemeClr val="accent1"/>
+          </a:lnRef>
+          <a:fillRef idx="0">
+            <a:schemeClr val="accent1"/>
+          </a:fillRef>
+          <a:effectRef idx="0">
+            <a:schemeClr val="accent1"/>
+          </a:effectRef>
+          <a:fontRef idx="minor">
+            <a:schemeClr val="tx1"/>
+          </a:fontRef>
+        </p:style>
+      </p:cxnSp>
+      <p:cxnSp>
+        <p:nvCxnSpPr>
+          <p:cNvPr id="80" name="Elbow Connector 79">
+            <a:extLst>
+              <a:ext uri="{FF2B5EF4-FFF2-40B4-BE49-F238E27FC236}">
+                <a16:creationId xmlns:a16="http://schemas.microsoft.com/office/drawing/2014/main" id="{3D3713E9-9433-8949-8FEC-DF9009DC8DB2}"/>
+              </a:ext>
+            </a:extLst>
+          </p:cNvPr>
+          <p:cNvCxnSpPr>
+            <a:cxnSpLocks/>
+            <a:endCxn id="16" idx="1"/>
+          </p:cNvCxnSpPr>
+          <p:nvPr/>
+        </p:nvCxnSpPr>
+        <p:spPr>
+          <a:xfrm flipV="1">
+            <a:off x="10816559" y="5224248"/>
+            <a:ext cx="1295761" cy="1101677"/>
+          </a:xfrm>
+          <a:prstGeom prst="bentConnector3">
+            <a:avLst/>
+          </a:prstGeom>
+          <a:ln w="12700">
+            <a:solidFill>
+              <a:srgbClr val="545B64"/>
+            </a:solidFill>
+            <a:headEnd type="none" w="med" len="sm"/>
+            <a:tailEnd type="arrow" w="med" len="sm"/>
+          </a:ln>
+        </p:spPr>
+        <p:style>
+          <a:lnRef idx="1">
+            <a:schemeClr val="accent1"/>
+          </a:lnRef>
+          <a:fillRef idx="0">
+            <a:schemeClr val="accent1"/>
+          </a:fillRef>
+          <a:effectRef idx="0">
+            <a:schemeClr val="accent1"/>
+          </a:effectRef>
+          <a:fontRef idx="minor">
+            <a:schemeClr val="tx1"/>
+          </a:fontRef>
+        </p:style>
+      </p:cxnSp>
+      <p:cxnSp>
+        <p:nvCxnSpPr>
+          <p:cNvPr id="84" name="Straight Arrow Connector 83">
+            <a:extLst>
+              <a:ext uri="{FF2B5EF4-FFF2-40B4-BE49-F238E27FC236}">
+                <a16:creationId xmlns:a16="http://schemas.microsoft.com/office/drawing/2014/main" id="{D03BCD79-CD28-1752-EB80-FB336A616714}"/>
               </a:ext>
             </a:extLst>
           </p:cNvPr>
@@ -12907,22 +12884,18 @@
         </p:nvCxnSpPr>
         <p:spPr>
           <a:xfrm flipV="1">
-            <a:off x="10816561" y="6317719"/>
-            <a:ext cx="1301992" cy="4799"/>
+            <a:off x="10834432" y="6317719"/>
+            <a:ext cx="1284121" cy="8206"/>
           </a:xfrm>
-          <a:prstGeom prst="bentConnector3">
-            <a:avLst>
-              <a:gd name="adj1" fmla="val 50000"/>
-            </a:avLst>
+          <a:prstGeom prst="straightConnector1">
+            <a:avLst/>
           </a:prstGeom>
-          <a:ln>
+          <a:ln w="12700">
             <a:solidFill>
-              <a:schemeClr val="tx1">
-                <a:lumMod val="50000"/>
-                <a:lumOff val="50000"/>
-              </a:schemeClr>
+              <a:srgbClr val="545B64"/>
             </a:solidFill>
-            <a:tailEnd type="triangle"/>
+            <a:headEnd type="none" w="med" len="sm"/>
+            <a:tailEnd type="arrow" w="med" len="sm"/>
           </a:ln>
         </p:spPr>
         <p:style>
@@ -15806,7 +15779,7 @@
         </p:nvGrpSpPr>
         <p:grpSpPr>
           <a:xfrm>
-            <a:off x="11161977" y="4735679"/>
+            <a:off x="11161977" y="4799179"/>
             <a:ext cx="2292350" cy="1035274"/>
             <a:chOff x="5799214" y="5995980"/>
             <a:chExt cx="2292350" cy="1035274"/>
@@ -16119,7 +16092,7 @@
         </p:nvGrpSpPr>
         <p:grpSpPr>
           <a:xfrm>
-            <a:off x="11196003" y="6160033"/>
+            <a:off x="11196003" y="6172733"/>
             <a:ext cx="2268537" cy="869451"/>
             <a:chOff x="2223484" y="1075236"/>
             <a:chExt cx="2268537" cy="869451"/>
@@ -16407,100 +16380,6 @@
           </a:extLst>
         </p:spPr>
       </p:pic>
-      <p:cxnSp>
-        <p:nvCxnSpPr>
-          <p:cNvPr id="58" name="Straight Connector 57">
-            <a:extLst>
-              <a:ext uri="{FF2B5EF4-FFF2-40B4-BE49-F238E27FC236}">
-                <a16:creationId xmlns:a16="http://schemas.microsoft.com/office/drawing/2014/main" id="{CB17ACE4-DC72-CB4E-7901-6DFC0DA9E765}"/>
-              </a:ext>
-            </a:extLst>
-          </p:cNvPr>
-          <p:cNvCxnSpPr>
-            <a:cxnSpLocks/>
-          </p:cNvCxnSpPr>
-          <p:nvPr/>
-        </p:nvCxnSpPr>
-        <p:spPr>
-          <a:xfrm flipV="1">
-            <a:off x="3062243" y="5211416"/>
-            <a:ext cx="801826" cy="502468"/>
-          </a:xfrm>
-          <a:prstGeom prst="line">
-            <a:avLst/>
-          </a:prstGeom>
-          <a:ln w="9525" cap="flat" cmpd="sng" algn="ctr">
-            <a:solidFill>
-              <a:schemeClr val="accent4"/>
-            </a:solidFill>
-            <a:prstDash val="dash"/>
-            <a:round/>
-            <a:headEnd type="none" w="med" len="med"/>
-            <a:tailEnd type="none" w="med" len="med"/>
-          </a:ln>
-        </p:spPr>
-        <p:style>
-          <a:lnRef idx="0">
-            <a:scrgbClr r="0" g="0" b="0"/>
-          </a:lnRef>
-          <a:fillRef idx="0">
-            <a:scrgbClr r="0" g="0" b="0"/>
-          </a:fillRef>
-          <a:effectRef idx="0">
-            <a:scrgbClr r="0" g="0" b="0"/>
-          </a:effectRef>
-          <a:fontRef idx="minor">
-            <a:schemeClr val="tx1"/>
-          </a:fontRef>
-        </p:style>
-      </p:cxnSp>
-      <p:cxnSp>
-        <p:nvCxnSpPr>
-          <p:cNvPr id="60" name="Straight Connector 59">
-            <a:extLst>
-              <a:ext uri="{FF2B5EF4-FFF2-40B4-BE49-F238E27FC236}">
-                <a16:creationId xmlns:a16="http://schemas.microsoft.com/office/drawing/2014/main" id="{4CB714C8-0937-395E-8ED3-7003186ED865}"/>
-              </a:ext>
-            </a:extLst>
-          </p:cNvPr>
-          <p:cNvCxnSpPr>
-            <a:cxnSpLocks/>
-          </p:cNvCxnSpPr>
-          <p:nvPr/>
-        </p:nvCxnSpPr>
-        <p:spPr>
-          <a:xfrm flipH="1" flipV="1">
-            <a:off x="4609371" y="5211416"/>
-            <a:ext cx="767714" cy="531346"/>
-          </a:xfrm>
-          <a:prstGeom prst="line">
-            <a:avLst/>
-          </a:prstGeom>
-          <a:ln w="9525" cap="flat" cmpd="sng" algn="ctr">
-            <a:solidFill>
-              <a:schemeClr val="accent4"/>
-            </a:solidFill>
-            <a:prstDash val="dash"/>
-            <a:round/>
-            <a:headEnd type="none" w="med" len="med"/>
-            <a:tailEnd type="none" w="med" len="med"/>
-          </a:ln>
-        </p:spPr>
-        <p:style>
-          <a:lnRef idx="0">
-            <a:scrgbClr r="0" g="0" b="0"/>
-          </a:lnRef>
-          <a:fillRef idx="0">
-            <a:scrgbClr r="0" g="0" b="0"/>
-          </a:fillRef>
-          <a:effectRef idx="0">
-            <a:scrgbClr r="0" g="0" b="0"/>
-          </a:effectRef>
-          <a:fontRef idx="minor">
-            <a:schemeClr val="tx1"/>
-          </a:fontRef>
-        </p:style>
-      </p:cxnSp>
       <p:pic>
         <p:nvPicPr>
           <p:cNvPr id="65" name="Graphic 13">
@@ -16868,7 +16747,7 @@
         <p:spPr bwMode="auto">
           <a:xfrm>
             <a:off x="9430066" y="5323951"/>
-            <a:ext cx="2018954" cy="430887"/>
+            <a:ext cx="1604964" cy="430887"/>
           </a:xfrm>
           <a:prstGeom prst="rect">
             <a:avLst/>
@@ -17310,7 +17189,7 @@
         <p:spPr bwMode="auto">
           <a:xfrm>
             <a:off x="9455466" y="6607999"/>
-            <a:ext cx="2018954" cy="261610"/>
+            <a:ext cx="1848804" cy="261610"/>
           </a:xfrm>
           <a:prstGeom prst="rect">
             <a:avLst/>
@@ -17454,158 +17333,6 @@
           </a:p>
         </p:txBody>
       </p:sp>
-      <p:cxnSp>
-        <p:nvCxnSpPr>
-          <p:cNvPr id="88" name="Elbow Connector 87">
-            <a:extLst>
-              <a:ext uri="{FF2B5EF4-FFF2-40B4-BE49-F238E27FC236}">
-                <a16:creationId xmlns:a16="http://schemas.microsoft.com/office/drawing/2014/main" id="{0167282E-1964-5EEE-E9F8-DE9E8610B5A9}"/>
-              </a:ext>
-            </a:extLst>
-          </p:cNvPr>
-          <p:cNvCxnSpPr>
-            <a:cxnSpLocks/>
-            <a:stCxn id="65" idx="1"/>
-            <a:endCxn id="43" idx="2"/>
-          </p:cNvCxnSpPr>
-          <p:nvPr/>
-        </p:nvCxnSpPr>
-        <p:spPr>
-          <a:xfrm rot="10800000" flipV="1">
-            <a:off x="2797667" y="4781530"/>
-            <a:ext cx="6186942" cy="1796792"/>
-          </a:xfrm>
-          <a:prstGeom prst="bentConnector4">
-            <a:avLst>
-              <a:gd name="adj1" fmla="val 22459"/>
-              <a:gd name="adj2" fmla="val 112723"/>
-            </a:avLst>
-          </a:prstGeom>
-          <a:ln>
-            <a:solidFill>
-              <a:schemeClr val="tx1">
-                <a:lumMod val="50000"/>
-                <a:lumOff val="50000"/>
-              </a:schemeClr>
-            </a:solidFill>
-            <a:tailEnd type="triangle"/>
-          </a:ln>
-        </p:spPr>
-        <p:style>
-          <a:lnRef idx="1">
-            <a:schemeClr val="accent1"/>
-          </a:lnRef>
-          <a:fillRef idx="0">
-            <a:schemeClr val="accent1"/>
-          </a:fillRef>
-          <a:effectRef idx="0">
-            <a:schemeClr val="accent1"/>
-          </a:effectRef>
-          <a:fontRef idx="minor">
-            <a:schemeClr val="tx1"/>
-          </a:fontRef>
-        </p:style>
-      </p:cxnSp>
-      <p:cxnSp>
-        <p:nvCxnSpPr>
-          <p:cNvPr id="95" name="Elbow Connector 94">
-            <a:extLst>
-              <a:ext uri="{FF2B5EF4-FFF2-40B4-BE49-F238E27FC236}">
-                <a16:creationId xmlns:a16="http://schemas.microsoft.com/office/drawing/2014/main" id="{C3DCB4D7-E257-59BF-14D0-71543885C726}"/>
-              </a:ext>
-            </a:extLst>
-          </p:cNvPr>
-          <p:cNvCxnSpPr>
-            <a:cxnSpLocks/>
-          </p:cNvCxnSpPr>
-          <p:nvPr/>
-        </p:nvCxnSpPr>
-        <p:spPr>
-          <a:xfrm>
-            <a:off x="10764371" y="5488037"/>
-            <a:ext cx="1265486" cy="1252375"/>
-          </a:xfrm>
-          <a:prstGeom prst="bentConnector3">
-            <a:avLst>
-              <a:gd name="adj1" fmla="val 62220"/>
-            </a:avLst>
-          </a:prstGeom>
-          <a:ln>
-            <a:solidFill>
-              <a:schemeClr val="tx1">
-                <a:lumMod val="50000"/>
-                <a:lumOff val="50000"/>
-              </a:schemeClr>
-            </a:solidFill>
-            <a:tailEnd type="triangle"/>
-          </a:ln>
-        </p:spPr>
-        <p:style>
-          <a:lnRef idx="1">
-            <a:schemeClr val="accent1"/>
-          </a:lnRef>
-          <a:fillRef idx="0">
-            <a:schemeClr val="accent1"/>
-          </a:fillRef>
-          <a:effectRef idx="0">
-            <a:schemeClr val="accent1"/>
-          </a:effectRef>
-          <a:fontRef idx="minor">
-            <a:schemeClr val="tx1"/>
-          </a:fontRef>
-        </p:style>
-      </p:cxnSp>
-      <p:cxnSp>
-        <p:nvCxnSpPr>
-          <p:cNvPr id="110" name="Elbow Connector 109">
-            <a:extLst>
-              <a:ext uri="{FF2B5EF4-FFF2-40B4-BE49-F238E27FC236}">
-                <a16:creationId xmlns:a16="http://schemas.microsoft.com/office/drawing/2014/main" id="{0638C9D3-934C-E2A5-65FD-6AA1D1278340}"/>
-              </a:ext>
-            </a:extLst>
-          </p:cNvPr>
-          <p:cNvCxnSpPr>
-            <a:cxnSpLocks/>
-            <a:stCxn id="118" idx="3"/>
-            <a:endCxn id="24" idx="1"/>
-          </p:cNvCxnSpPr>
-          <p:nvPr/>
-        </p:nvCxnSpPr>
-        <p:spPr>
-          <a:xfrm>
-            <a:off x="7875721" y="4055653"/>
-            <a:ext cx="579611" cy="1703"/>
-          </a:xfrm>
-          <a:prstGeom prst="bentConnector3">
-            <a:avLst>
-              <a:gd name="adj1" fmla="val 50000"/>
-            </a:avLst>
-          </a:prstGeom>
-          <a:ln>
-            <a:solidFill>
-              <a:schemeClr val="tx1">
-                <a:lumMod val="50000"/>
-                <a:lumOff val="50000"/>
-              </a:schemeClr>
-            </a:solidFill>
-            <a:tailEnd type="triangle"/>
-          </a:ln>
-        </p:spPr>
-        <p:style>
-          <a:lnRef idx="1">
-            <a:schemeClr val="accent1"/>
-          </a:lnRef>
-          <a:fillRef idx="0">
-            <a:schemeClr val="accent1"/>
-          </a:fillRef>
-          <a:effectRef idx="0">
-            <a:schemeClr val="accent1"/>
-          </a:effectRef>
-          <a:fontRef idx="minor">
-            <a:schemeClr val="tx1"/>
-          </a:fontRef>
-        </p:style>
-      </p:cxnSp>
       <p:pic>
         <p:nvPicPr>
           <p:cNvPr id="118" name="Graphic 13">
@@ -17666,57 +17393,6 @@
           </a:extLst>
         </p:spPr>
       </p:pic>
-      <p:cxnSp>
-        <p:nvCxnSpPr>
-          <p:cNvPr id="141" name="Elbow Connector 140">
-            <a:extLst>
-              <a:ext uri="{FF2B5EF4-FFF2-40B4-BE49-F238E27FC236}">
-                <a16:creationId xmlns:a16="http://schemas.microsoft.com/office/drawing/2014/main" id="{78F3B970-C2C2-0343-3C1D-92FA1199DD32}"/>
-              </a:ext>
-            </a:extLst>
-          </p:cNvPr>
-          <p:cNvCxnSpPr>
-            <a:cxnSpLocks/>
-            <a:stCxn id="5" idx="2"/>
-            <a:endCxn id="118" idx="0"/>
-          </p:cNvCxnSpPr>
-          <p:nvPr/>
-        </p:nvCxnSpPr>
-        <p:spPr>
-          <a:xfrm rot="16200000" flipH="1">
-            <a:off x="7391433" y="3571365"/>
-            <a:ext cx="509404" cy="1972"/>
-          </a:xfrm>
-          <a:prstGeom prst="bentConnector3">
-            <a:avLst>
-              <a:gd name="adj1" fmla="val 50000"/>
-            </a:avLst>
-          </a:prstGeom>
-          <a:ln>
-            <a:solidFill>
-              <a:schemeClr val="tx1">
-                <a:lumMod val="50000"/>
-                <a:lumOff val="50000"/>
-              </a:schemeClr>
-            </a:solidFill>
-            <a:tailEnd type="triangle"/>
-          </a:ln>
-        </p:spPr>
-        <p:style>
-          <a:lnRef idx="1">
-            <a:schemeClr val="accent1"/>
-          </a:lnRef>
-          <a:fillRef idx="0">
-            <a:schemeClr val="accent1"/>
-          </a:fillRef>
-          <a:effectRef idx="0">
-            <a:schemeClr val="accent1"/>
-          </a:effectRef>
-          <a:fontRef idx="minor">
-            <a:schemeClr val="tx1"/>
-          </a:fontRef>
-        </p:style>
-      </p:cxnSp>
       <p:sp>
         <p:nvSpPr>
           <p:cNvPr id="75" name="TextBox 9">
@@ -17891,10 +17567,297 @@
       </p:sp>
       <p:cxnSp>
         <p:nvCxnSpPr>
-          <p:cNvPr id="80" name="Elbow Connector 79">
+          <p:cNvPr id="74" name="Straight Arrow Connector 73">
             <a:extLst>
               <a:ext uri="{FF2B5EF4-FFF2-40B4-BE49-F238E27FC236}">
-                <a16:creationId xmlns:a16="http://schemas.microsoft.com/office/drawing/2014/main" id="{21E000BB-581D-7EF1-6B1D-B45A8D5E82E3}"/>
+                <a16:creationId xmlns:a16="http://schemas.microsoft.com/office/drawing/2014/main" id="{075CDC11-7350-9260-84F8-83F5C46A33B3}"/>
+              </a:ext>
+            </a:extLst>
+          </p:cNvPr>
+          <p:cNvCxnSpPr>
+            <a:cxnSpLocks/>
+            <a:stCxn id="5" idx="2"/>
+            <a:endCxn id="118" idx="0"/>
+          </p:cNvCxnSpPr>
+          <p:nvPr/>
+        </p:nvCxnSpPr>
+        <p:spPr>
+          <a:xfrm>
+            <a:off x="7645149" y="3317649"/>
+            <a:ext cx="1972" cy="509404"/>
+          </a:xfrm>
+          <a:prstGeom prst="straightConnector1">
+            <a:avLst/>
+          </a:prstGeom>
+          <a:ln w="12700">
+            <a:solidFill>
+              <a:srgbClr val="545B64"/>
+            </a:solidFill>
+            <a:headEnd type="none" w="med" len="sm"/>
+            <a:tailEnd type="arrow" w="med" len="sm"/>
+          </a:ln>
+        </p:spPr>
+        <p:style>
+          <a:lnRef idx="1">
+            <a:schemeClr val="accent1"/>
+          </a:lnRef>
+          <a:fillRef idx="0">
+            <a:schemeClr val="accent1"/>
+          </a:fillRef>
+          <a:effectRef idx="0">
+            <a:schemeClr val="accent1"/>
+          </a:effectRef>
+          <a:fontRef idx="minor">
+            <a:schemeClr val="tx1"/>
+          </a:fontRef>
+        </p:style>
+      </p:cxnSp>
+      <p:cxnSp>
+        <p:nvCxnSpPr>
+          <p:cNvPr id="76" name="Elbow Connector 75">
+            <a:extLst>
+              <a:ext uri="{FF2B5EF4-FFF2-40B4-BE49-F238E27FC236}">
+                <a16:creationId xmlns:a16="http://schemas.microsoft.com/office/drawing/2014/main" id="{60215F6B-F7D5-02AF-225D-D650D3AE1299}"/>
+              </a:ext>
+            </a:extLst>
+          </p:cNvPr>
+          <p:cNvCxnSpPr>
+            <a:cxnSpLocks/>
+            <a:stCxn id="65" idx="1"/>
+            <a:endCxn id="43" idx="2"/>
+          </p:cNvCxnSpPr>
+          <p:nvPr/>
+        </p:nvCxnSpPr>
+        <p:spPr>
+          <a:xfrm rot="10800000" flipV="1">
+            <a:off x="2797667" y="4781530"/>
+            <a:ext cx="6186942" cy="1796792"/>
+          </a:xfrm>
+          <a:prstGeom prst="bentConnector4">
+            <a:avLst>
+              <a:gd name="adj1" fmla="val 22502"/>
+              <a:gd name="adj2" fmla="val 112723"/>
+            </a:avLst>
+          </a:prstGeom>
+          <a:ln w="12700">
+            <a:solidFill>
+              <a:srgbClr val="545B64"/>
+            </a:solidFill>
+            <a:headEnd type="none" w="med" len="sm"/>
+            <a:tailEnd type="arrow" w="med" len="sm"/>
+          </a:ln>
+        </p:spPr>
+        <p:style>
+          <a:lnRef idx="1">
+            <a:schemeClr val="accent1"/>
+          </a:lnRef>
+          <a:fillRef idx="0">
+            <a:schemeClr val="accent1"/>
+          </a:fillRef>
+          <a:effectRef idx="0">
+            <a:schemeClr val="accent1"/>
+          </a:effectRef>
+          <a:fontRef idx="minor">
+            <a:schemeClr val="tx1"/>
+          </a:fontRef>
+        </p:style>
+      </p:cxnSp>
+      <p:cxnSp>
+        <p:nvCxnSpPr>
+          <p:cNvPr id="77" name="Straight Arrow Connector 76">
+            <a:extLst>
+              <a:ext uri="{FF2B5EF4-FFF2-40B4-BE49-F238E27FC236}">
+                <a16:creationId xmlns:a16="http://schemas.microsoft.com/office/drawing/2014/main" id="{74774594-9E5B-CE16-64B2-4DB1C0ED41A3}"/>
+              </a:ext>
+            </a:extLst>
+          </p:cNvPr>
+          <p:cNvCxnSpPr>
+            <a:cxnSpLocks/>
+          </p:cNvCxnSpPr>
+          <p:nvPr/>
+        </p:nvCxnSpPr>
+        <p:spPr>
+          <a:xfrm flipH="1">
+            <a:off x="3004873" y="5184955"/>
+            <a:ext cx="885347" cy="552871"/>
+          </a:xfrm>
+          <a:prstGeom prst="straightConnector1">
+            <a:avLst/>
+          </a:prstGeom>
+          <a:ln w="12700">
+            <a:solidFill>
+              <a:srgbClr val="545B64"/>
+            </a:solidFill>
+            <a:headEnd type="none" w="med" len="sm"/>
+            <a:tailEnd type="arrow" w="med" len="sm"/>
+          </a:ln>
+        </p:spPr>
+        <p:style>
+          <a:lnRef idx="1">
+            <a:schemeClr val="accent1"/>
+          </a:lnRef>
+          <a:fillRef idx="0">
+            <a:schemeClr val="accent1"/>
+          </a:fillRef>
+          <a:effectRef idx="0">
+            <a:schemeClr val="accent1"/>
+          </a:effectRef>
+          <a:fontRef idx="minor">
+            <a:schemeClr val="tx1"/>
+          </a:fontRef>
+        </p:style>
+      </p:cxnSp>
+      <p:cxnSp>
+        <p:nvCxnSpPr>
+          <p:cNvPr id="83" name="Straight Arrow Connector 82">
+            <a:extLst>
+              <a:ext uri="{FF2B5EF4-FFF2-40B4-BE49-F238E27FC236}">
+                <a16:creationId xmlns:a16="http://schemas.microsoft.com/office/drawing/2014/main" id="{246EB834-86CC-2FBC-9A0C-01E4ECFBAFCC}"/>
+              </a:ext>
+            </a:extLst>
+          </p:cNvPr>
+          <p:cNvCxnSpPr>
+            <a:cxnSpLocks/>
+            <a:stCxn id="118" idx="3"/>
+            <a:endCxn id="24" idx="1"/>
+          </p:cNvCxnSpPr>
+          <p:nvPr/>
+        </p:nvCxnSpPr>
+        <p:spPr>
+          <a:xfrm>
+            <a:off x="7875721" y="4055653"/>
+            <a:ext cx="579611" cy="1703"/>
+          </a:xfrm>
+          <a:prstGeom prst="straightConnector1">
+            <a:avLst/>
+          </a:prstGeom>
+          <a:ln w="12700">
+            <a:solidFill>
+              <a:srgbClr val="545B64"/>
+            </a:solidFill>
+            <a:headEnd type="none" w="med" len="sm"/>
+            <a:tailEnd type="arrow" w="med" len="sm"/>
+          </a:ln>
+        </p:spPr>
+        <p:style>
+          <a:lnRef idx="1">
+            <a:schemeClr val="accent1"/>
+          </a:lnRef>
+          <a:fillRef idx="0">
+            <a:schemeClr val="accent1"/>
+          </a:fillRef>
+          <a:effectRef idx="0">
+            <a:schemeClr val="accent1"/>
+          </a:effectRef>
+          <a:fontRef idx="minor">
+            <a:schemeClr val="tx1"/>
+          </a:fontRef>
+        </p:style>
+      </p:cxnSp>
+      <p:cxnSp>
+        <p:nvCxnSpPr>
+          <p:cNvPr id="84" name="Elbow Connector 83">
+            <a:extLst>
+              <a:ext uri="{FF2B5EF4-FFF2-40B4-BE49-F238E27FC236}">
+                <a16:creationId xmlns:a16="http://schemas.microsoft.com/office/drawing/2014/main" id="{98B38769-7CA3-4940-F0F9-B6118C4A6D1C}"/>
+              </a:ext>
+            </a:extLst>
+          </p:cNvPr>
+          <p:cNvCxnSpPr>
+            <a:cxnSpLocks/>
+            <a:stCxn id="73" idx="3"/>
+            <a:endCxn id="16" idx="1"/>
+          </p:cNvCxnSpPr>
+          <p:nvPr/>
+        </p:nvCxnSpPr>
+        <p:spPr>
+          <a:xfrm flipV="1">
+            <a:off x="11304270" y="5538837"/>
+            <a:ext cx="743632" cy="1199967"/>
+          </a:xfrm>
+          <a:prstGeom prst="bentConnector3">
+            <a:avLst>
+              <a:gd name="adj1" fmla="val 50000"/>
+            </a:avLst>
+          </a:prstGeom>
+          <a:ln w="12700">
+            <a:solidFill>
+              <a:srgbClr val="545B64"/>
+            </a:solidFill>
+            <a:headEnd type="none" w="med" len="sm"/>
+            <a:tailEnd type="arrow" w="med" len="sm"/>
+          </a:ln>
+        </p:spPr>
+        <p:style>
+          <a:lnRef idx="1">
+            <a:schemeClr val="accent1"/>
+          </a:lnRef>
+          <a:fillRef idx="0">
+            <a:schemeClr val="accent1"/>
+          </a:fillRef>
+          <a:effectRef idx="0">
+            <a:schemeClr val="accent1"/>
+          </a:effectRef>
+          <a:fontRef idx="minor">
+            <a:schemeClr val="tx1"/>
+          </a:fontRef>
+        </p:style>
+      </p:cxnSp>
+      <p:cxnSp>
+        <p:nvCxnSpPr>
+          <p:cNvPr id="85" name="Elbow Connector 84">
+            <a:extLst>
+              <a:ext uri="{FF2B5EF4-FFF2-40B4-BE49-F238E27FC236}">
+                <a16:creationId xmlns:a16="http://schemas.microsoft.com/office/drawing/2014/main" id="{B1E8E8F5-7523-8835-AFFE-6976E7618047}"/>
+              </a:ext>
+            </a:extLst>
+          </p:cNvPr>
+          <p:cNvCxnSpPr>
+            <a:cxnSpLocks/>
+            <a:stCxn id="69" idx="3"/>
+            <a:endCxn id="27" idx="1"/>
+          </p:cNvCxnSpPr>
+          <p:nvPr/>
+        </p:nvCxnSpPr>
+        <p:spPr>
+          <a:xfrm>
+            <a:off x="11035030" y="5539395"/>
+            <a:ext cx="994827" cy="1201017"/>
+          </a:xfrm>
+          <a:prstGeom prst="bentConnector3">
+            <a:avLst>
+              <a:gd name="adj1" fmla="val 64043"/>
+            </a:avLst>
+          </a:prstGeom>
+          <a:ln w="12700">
+            <a:solidFill>
+              <a:srgbClr val="545B64"/>
+            </a:solidFill>
+            <a:headEnd type="none" w="med" len="sm"/>
+            <a:tailEnd type="arrow" w="med" len="sm"/>
+          </a:ln>
+        </p:spPr>
+        <p:style>
+          <a:lnRef idx="1">
+            <a:schemeClr val="accent1"/>
+          </a:lnRef>
+          <a:fillRef idx="0">
+            <a:schemeClr val="accent1"/>
+          </a:fillRef>
+          <a:effectRef idx="0">
+            <a:schemeClr val="accent1"/>
+          </a:effectRef>
+          <a:fontRef idx="minor">
+            <a:schemeClr val="tx1"/>
+          </a:fontRef>
+        </p:style>
+      </p:cxnSp>
+      <p:cxnSp>
+        <p:nvCxnSpPr>
+          <p:cNvPr id="114" name="Elbow Connector 113">
+            <a:extLst>
+              <a:ext uri="{FF2B5EF4-FFF2-40B4-BE49-F238E27FC236}">
+                <a16:creationId xmlns:a16="http://schemas.microsoft.com/office/drawing/2014/main" id="{1A5FAC60-3CA3-F377-229D-535F4EA63DD9}"/>
               </a:ext>
             </a:extLst>
           </p:cNvPr>
@@ -17916,14 +17879,12 @@
               <a:gd name="adj2" fmla="val 120507"/>
             </a:avLst>
           </a:prstGeom>
-          <a:ln>
+          <a:ln w="12700">
             <a:solidFill>
-              <a:schemeClr val="tx1">
-                <a:lumMod val="50000"/>
-                <a:lumOff val="50000"/>
-              </a:schemeClr>
+              <a:srgbClr val="545B64"/>
             </a:solidFill>
-            <a:tailEnd type="triangle"/>
+            <a:headEnd type="none" w="med" len="sm"/>
+            <a:tailEnd type="arrow" w="med" len="sm"/>
           </a:ln>
         </p:spPr>
         <p:style>
@@ -17943,88 +17904,32 @@
       </p:cxnSp>
       <p:cxnSp>
         <p:nvCxnSpPr>
-          <p:cNvPr id="90" name="Elbow Connector 89">
+          <p:cNvPr id="122" name="Straight Arrow Connector 121">
             <a:extLst>
               <a:ext uri="{FF2B5EF4-FFF2-40B4-BE49-F238E27FC236}">
-                <a16:creationId xmlns:a16="http://schemas.microsoft.com/office/drawing/2014/main" id="{9AEA3CD7-4A00-B85C-F239-597DBC6C790D}"/>
+                <a16:creationId xmlns:a16="http://schemas.microsoft.com/office/drawing/2014/main" id="{48AB22B8-2CD1-DD4C-8D05-81E740D590E9}"/>
               </a:ext>
             </a:extLst>
           </p:cNvPr>
           <p:cNvCxnSpPr>
             <a:cxnSpLocks/>
-            <a:endCxn id="27" idx="1"/>
           </p:cNvCxnSpPr>
           <p:nvPr/>
         </p:nvCxnSpPr>
         <p:spPr>
-          <a:xfrm flipV="1">
-            <a:off x="11185790" y="6727712"/>
-            <a:ext cx="844067" cy="11092"/>
+          <a:xfrm>
+            <a:off x="4628730" y="5182575"/>
+            <a:ext cx="809947" cy="572263"/>
           </a:xfrm>
-          <a:prstGeom prst="bentConnector3">
-            <a:avLst>
-              <a:gd name="adj1" fmla="val 50000"/>
-            </a:avLst>
+          <a:prstGeom prst="straightConnector1">
+            <a:avLst/>
           </a:prstGeom>
-          <a:ln>
+          <a:ln w="12700">
             <a:solidFill>
-              <a:schemeClr val="tx1">
-                <a:lumMod val="50000"/>
-                <a:lumOff val="50000"/>
-              </a:schemeClr>
+              <a:srgbClr val="545B64"/>
             </a:solidFill>
-            <a:tailEnd type="triangle"/>
-          </a:ln>
-        </p:spPr>
-        <p:style>
-          <a:lnRef idx="1">
-            <a:schemeClr val="accent1"/>
-          </a:lnRef>
-          <a:fillRef idx="0">
-            <a:schemeClr val="accent1"/>
-          </a:fillRef>
-          <a:effectRef idx="0">
-            <a:schemeClr val="accent1"/>
-          </a:effectRef>
-          <a:fontRef idx="minor">
-            <a:schemeClr val="tx1"/>
-          </a:fontRef>
-        </p:style>
-      </p:cxnSp>
-      <p:cxnSp>
-        <p:nvCxnSpPr>
-          <p:cNvPr id="94" name="Elbow Connector 93">
-            <a:extLst>
-              <a:ext uri="{FF2B5EF4-FFF2-40B4-BE49-F238E27FC236}">
-                <a16:creationId xmlns:a16="http://schemas.microsoft.com/office/drawing/2014/main" id="{13B48893-E7EE-24F0-E41A-038D19B2EF52}"/>
-              </a:ext>
-            </a:extLst>
-          </p:cNvPr>
-          <p:cNvCxnSpPr>
-            <a:cxnSpLocks/>
-            <a:stCxn id="73" idx="3"/>
-            <a:endCxn id="16" idx="1"/>
-          </p:cNvCxnSpPr>
-          <p:nvPr/>
-        </p:nvCxnSpPr>
-        <p:spPr>
-          <a:xfrm flipV="1">
-            <a:off x="11474420" y="5475337"/>
-            <a:ext cx="573482" cy="1263467"/>
-          </a:xfrm>
-          <a:prstGeom prst="bentConnector3">
-            <a:avLst>
-              <a:gd name="adj1" fmla="val 12727"/>
-            </a:avLst>
-          </a:prstGeom>
-          <a:ln>
-            <a:solidFill>
-              <a:schemeClr val="tx1">
-                <a:lumMod val="50000"/>
-                <a:lumOff val="50000"/>
-              </a:schemeClr>
-            </a:solidFill>
-            <a:tailEnd type="triangle"/>
+            <a:headEnd type="none" w="med" len="sm"/>
+            <a:tailEnd type="arrow" w="med" len="sm"/>
           </a:ln>
         </p:spPr>
         <p:style>

</xml_diff>